<commit_message>
Final version for lms with docx and pptx
</commit_message>
<xml_diff>
--- a/Теоремика_финал.pptx
+++ b/Теоремика_финал.pptx
@@ -123,7 +123,7 @@
 <file path=ppt/revisionInfo.xml><?xml version="1.0" encoding="utf-8"?>
 <p1510:revInfo xmlns:a="http://schemas.openxmlformats.org/drawingml/2006/main" xmlns:r="http://schemas.openxmlformats.org/officeDocument/2006/relationships" xmlns:p1510="http://schemas.microsoft.com/office/powerpoint/2015/10/main">
   <p1510:revLst>
-    <p1510:client id="{95995BC2-F5C2-5807-8E97-20662EAE274A}" v="1331" dt="2025-04-24T17:24:25.834"/>
+    <p1510:client id="{22D5CE2F-51D6-B349-92A8-DE927A19F8E6}" v="16" dt="2025-05-17T14:38:59.999"/>
   </p1510:revLst>
 </p1510:revInfo>
 </file>
@@ -2316,7 +2316,7 @@
             <a:fld id="{A5B0A250-5CC0-1746-B209-08E8B0DAE6AF}" type="datetimeFigureOut">
               <a:rPr lang="en-US" smtClean="0"/>
               <a:pPr algn="l"/>
-              <a:t>5/12/2025</a:t>
+              <a:t>5/17/2025</a:t>
             </a:fld>
             <a:endParaRPr lang="en-US" dirty="0"/>
           </a:p>
@@ -3778,7 +3778,7 @@
           <a:p>
             <a:fld id="{A5B0A250-5CC0-1746-B209-08E8B0DAE6AF}" type="datetimeFigureOut">
               <a:rPr lang="en-US" smtClean="0"/>
-              <a:t>5/12/2025</a:t>
+              <a:t>5/17/2025</a:t>
             </a:fld>
             <a:endParaRPr lang="en-US" dirty="0"/>
           </a:p>
@@ -4708,7 +4708,7 @@
           <a:p>
             <a:fld id="{A5B0A250-5CC0-1746-B209-08E8B0DAE6AF}" type="datetimeFigureOut">
               <a:rPr lang="en-US" smtClean="0"/>
-              <a:t>5/12/2025</a:t>
+              <a:t>5/17/2025</a:t>
             </a:fld>
             <a:endParaRPr lang="en-US"/>
           </a:p>
@@ -6165,7 +6165,7 @@
           <a:p>
             <a:fld id="{A5B0A250-5CC0-1746-B209-08E8B0DAE6AF}" type="datetimeFigureOut">
               <a:rPr lang="en-US" smtClean="0"/>
-              <a:t>5/12/2025</a:t>
+              <a:t>5/17/2025</a:t>
             </a:fld>
             <a:endParaRPr lang="en-US" dirty="0"/>
           </a:p>
@@ -8521,7 +8521,7 @@
           <a:p>
             <a:fld id="{A5B0A250-5CC0-1746-B209-08E8B0DAE6AF}" type="datetimeFigureOut">
               <a:rPr lang="en-US" smtClean="0"/>
-              <a:t>5/12/2025</a:t>
+              <a:t>5/17/2025</a:t>
             </a:fld>
             <a:endParaRPr lang="en-US" dirty="0"/>
           </a:p>
@@ -9562,7 +9562,7 @@
           <a:p>
             <a:fld id="{A5B0A250-5CC0-1746-B209-08E8B0DAE6AF}" type="datetimeFigureOut">
               <a:rPr lang="en-US" smtClean="0"/>
-              <a:t>5/12/2025</a:t>
+              <a:t>5/17/2025</a:t>
             </a:fld>
             <a:endParaRPr lang="en-US" dirty="0"/>
           </a:p>
@@ -10775,7 +10775,7 @@
           <a:p>
             <a:fld id="{A5B0A250-5CC0-1746-B209-08E8B0DAE6AF}" type="datetimeFigureOut">
               <a:rPr lang="en-US" smtClean="0"/>
-              <a:t>5/12/2025</a:t>
+              <a:t>5/17/2025</a:t>
             </a:fld>
             <a:endParaRPr lang="en-US" dirty="0"/>
           </a:p>
@@ -11684,7 +11684,7 @@
           <a:p>
             <a:fld id="{A5B0A250-5CC0-1746-B209-08E8B0DAE6AF}" type="datetimeFigureOut">
               <a:rPr lang="en-US" smtClean="0"/>
-              <a:t>5/12/2025</a:t>
+              <a:t>5/17/2025</a:t>
             </a:fld>
             <a:endParaRPr lang="en-US" dirty="0"/>
           </a:p>
@@ -11843,7 +11843,7 @@
             <a:fld id="{A5B0A250-5CC0-1746-B209-08E8B0DAE6AF}" type="datetimeFigureOut">
               <a:rPr lang="en-US" smtClean="0"/>
               <a:pPr/>
-              <a:t>5/12/2025</a:t>
+              <a:t>5/17/2025</a:t>
             </a:fld>
             <a:endParaRPr lang="en-US" dirty="0"/>
           </a:p>
@@ -12826,7 +12826,7 @@
           <a:p>
             <a:fld id="{A5B0A250-5CC0-1746-B209-08E8B0DAE6AF}" type="datetimeFigureOut">
               <a:rPr lang="en-US" smtClean="0"/>
-              <a:t>5/12/2025</a:t>
+              <a:t>5/17/2025</a:t>
             </a:fld>
             <a:endParaRPr lang="en-US" dirty="0"/>
           </a:p>
@@ -13888,7 +13888,7 @@
           <a:p>
             <a:fld id="{A5B0A250-5CC0-1746-B209-08E8B0DAE6AF}" type="datetimeFigureOut">
               <a:rPr lang="en-US" smtClean="0"/>
-              <a:t>5/12/2025</a:t>
+              <a:t>5/17/2025</a:t>
             </a:fld>
             <a:endParaRPr lang="en-US" dirty="0"/>
           </a:p>
@@ -14176,7 +14176,7 @@
             <a:fld id="{A5B0A250-5CC0-1746-B209-08E8B0DAE6AF}" type="datetimeFigureOut">
               <a:rPr lang="en-US" smtClean="0"/>
               <a:pPr/>
-              <a:t>5/12/2025</a:t>
+              <a:t>5/17/2025</a:t>
             </a:fld>
             <a:endParaRPr lang="en-US" dirty="0"/>
           </a:p>
@@ -14612,7 +14612,7 @@
                 <a16:creationId xmlns:a16="http://schemas.microsoft.com/office/drawing/2014/main" id="{4EFE82FE-7465-AE46-88DF-34D347E83B84}"/>
               </a:ext>
               <a:ext uri="{C183D7F6-B498-43B3-948B-1728B52AA6E4}">
-                <adec:decorative xmlns:adec="http://schemas.microsoft.com/office/drawing/2017/decorative" xmlns="" val="1"/>
+                <adec:decorative xmlns:adec="http://schemas.microsoft.com/office/drawing/2017/decorative" val="1"/>
               </a:ext>
             </a:extLst>
           </p:cNvPr>
@@ -14729,7 +14729,7 @@
               <a:rPr lang="ru-RU" dirty="0">
                 <a:latin typeface="Montserrat"/>
               </a:rPr>
-              <a:t>Зотов Артём 10П</a:t>
+              <a:t>Зотов Артём</a:t>
             </a:r>
           </a:p>
         </p:txBody>
@@ -14742,7 +14742,7 @@
                 <a16:creationId xmlns:a16="http://schemas.microsoft.com/office/drawing/2014/main" id="{EEA70831-9A8D-3B4D-8EA5-EE32F93E94E9}"/>
               </a:ext>
               <a:ext uri="{C183D7F6-B498-43B3-948B-1728B52AA6E4}">
-                <adec:decorative xmlns:adec="http://schemas.microsoft.com/office/drawing/2017/decorative" xmlns="" val="1"/>
+                <adec:decorative xmlns:adec="http://schemas.microsoft.com/office/drawing/2017/decorative" val="1"/>
               </a:ext>
             </a:extLst>
           </p:cNvPr>
@@ -14806,7 +14806,7 @@
           <a:blip r:embed="rId2">
             <a:extLst>
               <a:ext uri="{96DAC541-7B7A-43D3-8B79-37D633B846F1}">
-                <asvg:svgBlip xmlns:asvg="http://schemas.microsoft.com/office/drawing/2016/SVG/main" xmlns="" r:embed="rId3"/>
+                <asvg:svgBlip xmlns:asvg="http://schemas.microsoft.com/office/drawing/2016/SVG/main" r:embed="rId3"/>
               </a:ext>
             </a:extLst>
           </a:blip>
@@ -14832,7 +14832,7 @@
                 <a16:creationId xmlns:a16="http://schemas.microsoft.com/office/drawing/2014/main" id="{1B5E71B3-7269-894E-A00B-31D341365FC9}"/>
               </a:ext>
               <a:ext uri="{C183D7F6-B498-43B3-948B-1728B52AA6E4}">
-                <adec:decorative xmlns:adec="http://schemas.microsoft.com/office/drawing/2017/decorative" xmlns="" val="1"/>
+                <adec:decorative xmlns:adec="http://schemas.microsoft.com/office/drawing/2017/decorative" val="1"/>
               </a:ext>
             </a:extLst>
           </p:cNvPr>
@@ -14863,7 +14863,7 @@
                   <a16:creationId xmlns:a16="http://schemas.microsoft.com/office/drawing/2014/main" id="{FFFA3A20-1539-CC4A-9BE1-7415FE5A98C6}"/>
                 </a:ext>
                 <a:ext uri="{C183D7F6-B498-43B3-948B-1728B52AA6E4}">
-                  <adec:decorative xmlns:adec="http://schemas.microsoft.com/office/drawing/2017/decorative" xmlns="" val="1"/>
+                  <adec:decorative xmlns:adec="http://schemas.microsoft.com/office/drawing/2017/decorative" val="1"/>
                 </a:ext>
               </a:extLst>
             </p:cNvPr>
@@ -14981,7 +14981,7 @@
                   <a16:creationId xmlns:a16="http://schemas.microsoft.com/office/drawing/2014/main" id="{44EBCCFB-8EAB-2442-8E02-293F08D50B5C}"/>
                 </a:ext>
                 <a:ext uri="{C183D7F6-B498-43B3-948B-1728B52AA6E4}">
-                  <adec:decorative xmlns:adec="http://schemas.microsoft.com/office/drawing/2017/decorative" xmlns="" val="1"/>
+                  <adec:decorative xmlns:adec="http://schemas.microsoft.com/office/drawing/2017/decorative" val="1"/>
                 </a:ext>
               </a:extLst>
             </p:cNvPr>
@@ -15099,7 +15099,7 @@
                   <a16:creationId xmlns:a16="http://schemas.microsoft.com/office/drawing/2014/main" id="{AFD14830-CC36-D64E-8173-3980425632A8}"/>
                 </a:ext>
                 <a:ext uri="{C183D7F6-B498-43B3-948B-1728B52AA6E4}">
-                  <adec:decorative xmlns:adec="http://schemas.microsoft.com/office/drawing/2017/decorative" xmlns="" val="1"/>
+                  <adec:decorative xmlns:adec="http://schemas.microsoft.com/office/drawing/2017/decorative" val="1"/>
                 </a:ext>
               </a:extLst>
             </p:cNvPr>
@@ -15217,7 +15217,7 @@
                   <a16:creationId xmlns:a16="http://schemas.microsoft.com/office/drawing/2014/main" id="{FAA40AB8-EB6E-A44D-B3CA-7D25B64F5A4D}"/>
                 </a:ext>
                 <a:ext uri="{C183D7F6-B498-43B3-948B-1728B52AA6E4}">
-                  <adec:decorative xmlns:adec="http://schemas.microsoft.com/office/drawing/2017/decorative" xmlns="" val="1"/>
+                  <adec:decorative xmlns:adec="http://schemas.microsoft.com/office/drawing/2017/decorative" val="1"/>
                 </a:ext>
               </a:extLst>
             </p:cNvPr>
@@ -15326,6 +15326,36 @@
           </p:txBody>
         </p:sp>
       </p:grpSp>
+      <p:pic>
+        <p:nvPicPr>
+          <p:cNvPr id="5" name="Рисунок 4" descr="Изображение выглядит как снимок экрана, дизайн&#10;&#10;Содержимое, созданное искусственным интеллектом, может быть неверным.">
+            <a:extLst>
+              <a:ext uri="{FF2B5EF4-FFF2-40B4-BE49-F238E27FC236}">
+                <a16:creationId xmlns:a16="http://schemas.microsoft.com/office/drawing/2014/main" id="{3B870263-6270-94B4-D243-65F9345395A8}"/>
+              </a:ext>
+            </a:extLst>
+          </p:cNvPr>
+          <p:cNvPicPr>
+            <a:picLocks noChangeAspect="1"/>
+          </p:cNvPicPr>
+          <p:nvPr/>
+        </p:nvPicPr>
+        <p:blipFill>
+          <a:blip r:embed="rId4"/>
+          <a:stretch>
+            <a:fillRect/>
+          </a:stretch>
+        </p:blipFill>
+        <p:spPr>
+          <a:xfrm>
+            <a:off x="7242495" y="2907921"/>
+            <a:ext cx="3048000" cy="3181350"/>
+          </a:xfrm>
+          <a:prstGeom prst="rect">
+            <a:avLst/>
+          </a:prstGeom>
+        </p:spPr>
+      </p:pic>
     </p:spTree>
     <p:extLst>
       <p:ext uri="{BB962C8B-B14F-4D97-AF65-F5344CB8AC3E}">
@@ -15659,7 +15689,7 @@
                 <a16:creationId xmlns:a16="http://schemas.microsoft.com/office/drawing/2014/main" id="{D33A3282-0389-C547-8CA6-7F3E7F27B34D}"/>
               </a:ext>
               <a:ext uri="{C183D7F6-B498-43B3-948B-1728B52AA6E4}">
-                <adec:decorative xmlns:adec="http://schemas.microsoft.com/office/drawing/2017/decorative" xmlns="" val="1"/>
+                <adec:decorative xmlns:adec="http://schemas.microsoft.com/office/drawing/2017/decorative" val="1"/>
               </a:ext>
             </a:extLst>
           </p:cNvPr>
@@ -15757,7 +15787,7 @@
                 <a16:creationId xmlns:a16="http://schemas.microsoft.com/office/drawing/2014/main" id="{B4F75AE3-A3AC-DE4C-98FE-EC9DC3BF8DA5}"/>
               </a:ext>
               <a:ext uri="{C183D7F6-B498-43B3-948B-1728B52AA6E4}">
-                <adec:decorative xmlns:adec="http://schemas.microsoft.com/office/drawing/2017/decorative" xmlns="" val="1"/>
+                <adec:decorative xmlns:adec="http://schemas.microsoft.com/office/drawing/2017/decorative" val="1"/>
               </a:ext>
             </a:extLst>
           </p:cNvPr>
@@ -15876,7 +15906,7 @@
                 <a16:creationId xmlns:a16="http://schemas.microsoft.com/office/drawing/2014/main" id="{41C79BB7-CCAB-2243-9830-5569626C4D01}"/>
               </a:ext>
               <a:ext uri="{C183D7F6-B498-43B3-948B-1728B52AA6E4}">
-                <adec:decorative xmlns:adec="http://schemas.microsoft.com/office/drawing/2017/decorative" xmlns="" val="1"/>
+                <adec:decorative xmlns:adec="http://schemas.microsoft.com/office/drawing/2017/decorative" val="1"/>
               </a:ext>
             </a:extLst>
           </p:cNvPr>
@@ -15966,7 +15996,7 @@
                 <a16:creationId xmlns:a16="http://schemas.microsoft.com/office/drawing/2014/main" id="{4EFE82FE-7465-AE46-88DF-34D347E83B84}"/>
               </a:ext>
               <a:ext uri="{C183D7F6-B498-43B3-948B-1728B52AA6E4}">
-                <adec:decorative xmlns:adec="http://schemas.microsoft.com/office/drawing/2017/decorative" xmlns="" val="1"/>
+                <adec:decorative xmlns:adec="http://schemas.microsoft.com/office/drawing/2017/decorative" val="1"/>
               </a:ext>
             </a:extLst>
           </p:cNvPr>
@@ -16424,7 +16454,7 @@
                 <a16:creationId xmlns:a16="http://schemas.microsoft.com/office/drawing/2014/main" id="{1B5E71B3-7269-894E-A00B-31D341365FC9}"/>
               </a:ext>
               <a:ext uri="{C183D7F6-B498-43B3-948B-1728B52AA6E4}">
-                <adec:decorative xmlns:adec="http://schemas.microsoft.com/office/drawing/2017/decorative" xmlns="" val="1"/>
+                <adec:decorative xmlns:adec="http://schemas.microsoft.com/office/drawing/2017/decorative" val="1"/>
               </a:ext>
             </a:extLst>
           </p:cNvPr>
@@ -16455,7 +16485,7 @@
                   <a16:creationId xmlns:a16="http://schemas.microsoft.com/office/drawing/2014/main" id="{FFFA3A20-1539-CC4A-9BE1-7415FE5A98C6}"/>
                 </a:ext>
                 <a:ext uri="{C183D7F6-B498-43B3-948B-1728B52AA6E4}">
-                  <adec:decorative xmlns:adec="http://schemas.microsoft.com/office/drawing/2017/decorative" xmlns="" val="1"/>
+                  <adec:decorative xmlns:adec="http://schemas.microsoft.com/office/drawing/2017/decorative" val="1"/>
                 </a:ext>
               </a:extLst>
             </p:cNvPr>
@@ -16573,7 +16603,7 @@
                   <a16:creationId xmlns:a16="http://schemas.microsoft.com/office/drawing/2014/main" id="{44EBCCFB-8EAB-2442-8E02-293F08D50B5C}"/>
                 </a:ext>
                 <a:ext uri="{C183D7F6-B498-43B3-948B-1728B52AA6E4}">
-                  <adec:decorative xmlns:adec="http://schemas.microsoft.com/office/drawing/2017/decorative" xmlns="" val="1"/>
+                  <adec:decorative xmlns:adec="http://schemas.microsoft.com/office/drawing/2017/decorative" val="1"/>
                 </a:ext>
               </a:extLst>
             </p:cNvPr>
@@ -16691,7 +16721,7 @@
                   <a16:creationId xmlns:a16="http://schemas.microsoft.com/office/drawing/2014/main" id="{AFD14830-CC36-D64E-8173-3980425632A8}"/>
                 </a:ext>
                 <a:ext uri="{C183D7F6-B498-43B3-948B-1728B52AA6E4}">
-                  <adec:decorative xmlns:adec="http://schemas.microsoft.com/office/drawing/2017/decorative" xmlns="" val="1"/>
+                  <adec:decorative xmlns:adec="http://schemas.microsoft.com/office/drawing/2017/decorative" val="1"/>
                 </a:ext>
               </a:extLst>
             </p:cNvPr>
@@ -16809,7 +16839,7 @@
                   <a16:creationId xmlns:a16="http://schemas.microsoft.com/office/drawing/2014/main" id="{FAA40AB8-EB6E-A44D-B3CA-7D25B64F5A4D}"/>
                 </a:ext>
                 <a:ext uri="{C183D7F6-B498-43B3-948B-1728B52AA6E4}">
-                  <adec:decorative xmlns:adec="http://schemas.microsoft.com/office/drawing/2017/decorative" xmlns="" val="1"/>
+                  <adec:decorative xmlns:adec="http://schemas.microsoft.com/office/drawing/2017/decorative" val="1"/>
                 </a:ext>
               </a:extLst>
             </p:cNvPr>
@@ -16926,7 +16956,7 @@
                 <a16:creationId xmlns:a16="http://schemas.microsoft.com/office/drawing/2014/main" id="{EEA70831-9A8D-3B4D-8EA5-EE32F93E94E9}"/>
               </a:ext>
               <a:ext uri="{C183D7F6-B498-43B3-948B-1728B52AA6E4}">
-                <adec:decorative xmlns:adec="http://schemas.microsoft.com/office/drawing/2017/decorative" xmlns="" val="1"/>
+                <adec:decorative xmlns:adec="http://schemas.microsoft.com/office/drawing/2017/decorative" val="1"/>
               </a:ext>
             </a:extLst>
           </p:cNvPr>
@@ -17048,7 +17078,7 @@
                 <a16:creationId xmlns:a16="http://schemas.microsoft.com/office/drawing/2014/main" id="{4EFE82FE-7465-AE46-88DF-34D347E83B84}"/>
               </a:ext>
               <a:ext uri="{C183D7F6-B498-43B3-948B-1728B52AA6E4}">
-                <adec:decorative xmlns:adec="http://schemas.microsoft.com/office/drawing/2017/decorative" xmlns="" val="1"/>
+                <adec:decorative xmlns:adec="http://schemas.microsoft.com/office/drawing/2017/decorative" val="1"/>
               </a:ext>
             </a:extLst>
           </p:cNvPr>
@@ -17437,7 +17467,7 @@
                 <a16:creationId xmlns:a16="http://schemas.microsoft.com/office/drawing/2014/main" id="{1B5E71B3-7269-894E-A00B-31D341365FC9}"/>
               </a:ext>
               <a:ext uri="{C183D7F6-B498-43B3-948B-1728B52AA6E4}">
-                <adec:decorative xmlns:adec="http://schemas.microsoft.com/office/drawing/2017/decorative" xmlns="" val="1"/>
+                <adec:decorative xmlns:adec="http://schemas.microsoft.com/office/drawing/2017/decorative" val="1"/>
               </a:ext>
             </a:extLst>
           </p:cNvPr>
@@ -17468,7 +17498,7 @@
                   <a16:creationId xmlns:a16="http://schemas.microsoft.com/office/drawing/2014/main" id="{FFFA3A20-1539-CC4A-9BE1-7415FE5A98C6}"/>
                 </a:ext>
                 <a:ext uri="{C183D7F6-B498-43B3-948B-1728B52AA6E4}">
-                  <adec:decorative xmlns:adec="http://schemas.microsoft.com/office/drawing/2017/decorative" xmlns="" val="1"/>
+                  <adec:decorative xmlns:adec="http://schemas.microsoft.com/office/drawing/2017/decorative" val="1"/>
                 </a:ext>
               </a:extLst>
             </p:cNvPr>
@@ -17586,7 +17616,7 @@
                   <a16:creationId xmlns:a16="http://schemas.microsoft.com/office/drawing/2014/main" id="{44EBCCFB-8EAB-2442-8E02-293F08D50B5C}"/>
                 </a:ext>
                 <a:ext uri="{C183D7F6-B498-43B3-948B-1728B52AA6E4}">
-                  <adec:decorative xmlns:adec="http://schemas.microsoft.com/office/drawing/2017/decorative" xmlns="" val="1"/>
+                  <adec:decorative xmlns:adec="http://schemas.microsoft.com/office/drawing/2017/decorative" val="1"/>
                 </a:ext>
               </a:extLst>
             </p:cNvPr>
@@ -17704,7 +17734,7 @@
                   <a16:creationId xmlns:a16="http://schemas.microsoft.com/office/drawing/2014/main" id="{AFD14830-CC36-D64E-8173-3980425632A8}"/>
                 </a:ext>
                 <a:ext uri="{C183D7F6-B498-43B3-948B-1728B52AA6E4}">
-                  <adec:decorative xmlns:adec="http://schemas.microsoft.com/office/drawing/2017/decorative" xmlns="" val="1"/>
+                  <adec:decorative xmlns:adec="http://schemas.microsoft.com/office/drawing/2017/decorative" val="1"/>
                 </a:ext>
               </a:extLst>
             </p:cNvPr>
@@ -17822,7 +17852,7 @@
                   <a16:creationId xmlns:a16="http://schemas.microsoft.com/office/drawing/2014/main" id="{FAA40AB8-EB6E-A44D-B3CA-7D25B64F5A4D}"/>
                 </a:ext>
                 <a:ext uri="{C183D7F6-B498-43B3-948B-1728B52AA6E4}">
-                  <adec:decorative xmlns:adec="http://schemas.microsoft.com/office/drawing/2017/decorative" xmlns="" val="1"/>
+                  <adec:decorative xmlns:adec="http://schemas.microsoft.com/office/drawing/2017/decorative" val="1"/>
                 </a:ext>
               </a:extLst>
             </p:cNvPr>
@@ -17939,7 +17969,7 @@
                 <a16:creationId xmlns:a16="http://schemas.microsoft.com/office/drawing/2014/main" id="{EEA70831-9A8D-3B4D-8EA5-EE32F93E94E9}"/>
               </a:ext>
               <a:ext uri="{C183D7F6-B498-43B3-948B-1728B52AA6E4}">
-                <adec:decorative xmlns:adec="http://schemas.microsoft.com/office/drawing/2017/decorative" xmlns="" val="1"/>
+                <adec:decorative xmlns:adec="http://schemas.microsoft.com/office/drawing/2017/decorative" val="1"/>
               </a:ext>
             </a:extLst>
           </p:cNvPr>
@@ -18061,7 +18091,7 @@
                 <a16:creationId xmlns:a16="http://schemas.microsoft.com/office/drawing/2014/main" id="{C7F2E4D6-EF46-1C43-8F3E-3620C3C83F36}"/>
               </a:ext>
               <a:ext uri="{C183D7F6-B498-43B3-948B-1728B52AA6E4}">
-                <adec:decorative xmlns:adec="http://schemas.microsoft.com/office/drawing/2017/decorative" xmlns="" val="1"/>
+                <adec:decorative xmlns:adec="http://schemas.microsoft.com/office/drawing/2017/decorative" val="1"/>
               </a:ext>
             </a:extLst>
           </p:cNvPr>
@@ -18174,7 +18204,7 @@
         </p:spPr>
         <p:txBody>
           <a:bodyPr vert="horz" lIns="91440" tIns="45720" rIns="91440" bIns="45720" rtlCol="0" anchor="t">
-            <a:normAutofit/>
+            <a:normAutofit lnSpcReduction="10000"/>
           </a:bodyPr>
           <a:lstStyle/>
           <a:p>
@@ -18419,7 +18449,7 @@
               <a:t> </a:t>
             </a:r>
             <a:r>
-              <a:rPr lang="en-US" dirty="0" err="1" smtClean="0">
+              <a:rPr lang="en-US" dirty="0" err="1">
                 <a:latin typeface="Montserrat"/>
                 <a:ea typeface="Calibri"/>
                 <a:cs typeface="Calibri"/>
@@ -18427,143 +18457,111 @@
               <a:t>просмотров</a:t>
             </a:r>
             <a:r>
-              <a:rPr lang="en-US" dirty="0" smtClean="0">
+              <a:rPr lang="en-US" dirty="0">
                 <a:latin typeface="Montserrat"/>
                 <a:ea typeface="Calibri"/>
                 <a:cs typeface="Calibri"/>
               </a:rPr>
-              <a:t> </a:t>
-            </a:r>
-            <a:r>
-              <a:rPr lang="en-US" dirty="0">
+              <a:t> и "</a:t>
+            </a:r>
+            <a:r>
+              <a:rPr lang="en-US" dirty="0" err="1">
                 <a:latin typeface="Montserrat"/>
                 <a:ea typeface="Calibri"/>
                 <a:cs typeface="Calibri"/>
               </a:rPr>
-              <a:t>и "</a:t>
-            </a:r>
-            <a:r>
-              <a:rPr lang="en-US" dirty="0" err="1">
+              <a:t>сердечко</a:t>
+            </a:r>
+            <a:r>
+              <a:rPr lang="en-US" dirty="0">
                 <a:latin typeface="Montserrat"/>
                 <a:ea typeface="Calibri"/>
                 <a:cs typeface="Calibri"/>
               </a:rPr>
-              <a:t>сердечко</a:t>
-            </a:r>
-            <a:r>
-              <a:rPr lang="en-US" dirty="0">
+              <a:t>" </a:t>
+            </a:r>
+            <a:r>
+              <a:rPr lang="en-US" dirty="0" err="1">
                 <a:latin typeface="Montserrat"/>
                 <a:ea typeface="Calibri"/>
                 <a:cs typeface="Calibri"/>
               </a:rPr>
-              <a:t>" </a:t>
-            </a:r>
-            <a:r>
-              <a:rPr lang="en-US" dirty="0" err="1">
+              <a:t>для</a:t>
+            </a:r>
+            <a:r>
+              <a:rPr lang="en-US" dirty="0">
                 <a:latin typeface="Montserrat"/>
                 <a:ea typeface="Calibri"/>
                 <a:cs typeface="Calibri"/>
               </a:rPr>
-              <a:t>для</a:t>
-            </a:r>
-            <a:r>
-              <a:rPr lang="en-US" dirty="0">
+              <a:t> </a:t>
+            </a:r>
+            <a:r>
+              <a:rPr lang="en-US" dirty="0" err="1">
                 <a:latin typeface="Montserrat"/>
                 <a:ea typeface="Calibri"/>
                 <a:cs typeface="Calibri"/>
               </a:rPr>
-              <a:t> </a:t>
-            </a:r>
-            <a:r>
-              <a:rPr lang="en-US" dirty="0" err="1">
+              <a:t>добавления</a:t>
+            </a:r>
+            <a:r>
+              <a:rPr lang="en-US" dirty="0">
                 <a:latin typeface="Montserrat"/>
                 <a:ea typeface="Calibri"/>
                 <a:cs typeface="Calibri"/>
               </a:rPr>
-              <a:t>добавления</a:t>
-            </a:r>
-            <a:r>
-              <a:rPr lang="en-US" dirty="0">
+              <a:t> в </a:t>
+            </a:r>
+            <a:r>
+              <a:rPr lang="en-US" dirty="0" err="1">
                 <a:latin typeface="Montserrat"/>
                 <a:ea typeface="Calibri"/>
                 <a:cs typeface="Calibri"/>
               </a:rPr>
-              <a:t> в </a:t>
-            </a:r>
-            <a:r>
-              <a:rPr lang="en-US" dirty="0" err="1">
+              <a:t>раздел</a:t>
+            </a:r>
+            <a:r>
+              <a:rPr lang="en-US" dirty="0">
                 <a:latin typeface="Montserrat"/>
                 <a:ea typeface="Calibri"/>
                 <a:cs typeface="Calibri"/>
               </a:rPr>
-              <a:t>раздел</a:t>
-            </a:r>
-            <a:r>
-              <a:rPr lang="en-US" dirty="0">
+              <a:t> "</a:t>
+            </a:r>
+            <a:r>
+              <a:rPr lang="en-US" dirty="0" err="1">
                 <a:latin typeface="Montserrat"/>
                 <a:ea typeface="Calibri"/>
                 <a:cs typeface="Calibri"/>
               </a:rPr>
-              <a:t> "</a:t>
-            </a:r>
-            <a:r>
-              <a:rPr lang="en-US" dirty="0" err="1">
+              <a:t>Избранное</a:t>
+            </a:r>
+            <a:r>
+              <a:rPr lang="en-US" dirty="0">
                 <a:latin typeface="Montserrat"/>
                 <a:ea typeface="Calibri"/>
                 <a:cs typeface="Calibri"/>
               </a:rPr>
-              <a:t>Избранное</a:t>
-            </a:r>
-            <a:r>
-              <a:rPr lang="en-US" dirty="0" smtClean="0">
+              <a:t>". </a:t>
+            </a:r>
+            <a:r>
+              <a:rPr lang="ru-RU" dirty="0">
                 <a:latin typeface="Montserrat"/>
                 <a:ea typeface="Calibri"/>
                 <a:cs typeface="Calibri"/>
               </a:rPr>
-              <a:t>". </a:t>
-            </a:r>
-            <a:r>
-              <a:rPr lang="ru-RU" dirty="0" smtClean="0">
+              <a:t>Также, если вы администратор, то будет доступна кнопка редактора. </a:t>
+            </a:r>
+            <a:r>
+              <a:rPr lang="en-US" dirty="0" err="1">
                 <a:latin typeface="Montserrat"/>
                 <a:ea typeface="Calibri"/>
                 <a:cs typeface="Calibri"/>
               </a:rPr>
-              <a:t>Также, если вы администратор, то будет </a:t>
-            </a:r>
-            <a:r>
-              <a:rPr lang="ru-RU" dirty="0" err="1" smtClean="0">
-                <a:latin typeface="Montserrat"/>
-                <a:ea typeface="Calibri"/>
-                <a:cs typeface="Calibri"/>
-              </a:rPr>
-              <a:t>досутпна</a:t>
-            </a:r>
-            <a:r>
-              <a:rPr lang="ru-RU" dirty="0" smtClean="0">
-                <a:latin typeface="Montserrat"/>
-                <a:ea typeface="Calibri"/>
-                <a:cs typeface="Calibri"/>
-              </a:rPr>
-              <a:t> кнопка редактора</a:t>
-            </a:r>
-            <a:r>
-              <a:rPr lang="ru-RU" dirty="0" smtClean="0">
-                <a:latin typeface="Montserrat"/>
-                <a:ea typeface="Calibri"/>
-                <a:cs typeface="Calibri"/>
-              </a:rPr>
-              <a:t>. </a:t>
-            </a:r>
-            <a:r>
-              <a:rPr lang="en-US" dirty="0" err="1" smtClean="0">
-                <a:latin typeface="Montserrat"/>
-                <a:ea typeface="Calibri"/>
-                <a:cs typeface="Calibri"/>
-              </a:rPr>
               <a:t>При</a:t>
             </a:r>
             <a:r>
-              <a:rPr lang="en-US" dirty="0" smtClean="0">
+              <a:rPr lang="en-US" dirty="0">
                 <a:latin typeface="Montserrat"/>
                 <a:ea typeface="Calibri"/>
                 <a:cs typeface="Calibri"/>
@@ -18752,7 +18750,7 @@
                 <a16:creationId xmlns:a16="http://schemas.microsoft.com/office/drawing/2014/main" id="{97620302-BEE8-1447-8324-5F4178AA169B}"/>
               </a:ext>
               <a:ext uri="{C183D7F6-B498-43B3-948B-1728B52AA6E4}">
-                <adec:decorative xmlns:adec="http://schemas.microsoft.com/office/drawing/2017/decorative" xmlns="" val="1"/>
+                <adec:decorative xmlns:adec="http://schemas.microsoft.com/office/drawing/2017/decorative" val="1"/>
               </a:ext>
             </a:extLst>
           </p:cNvPr>
@@ -18783,7 +18781,7 @@
                   <a16:creationId xmlns:a16="http://schemas.microsoft.com/office/drawing/2014/main" id="{075332F5-EA0C-8B40-ADC9-D024EBD77161}"/>
                 </a:ext>
                 <a:ext uri="{C183D7F6-B498-43B3-948B-1728B52AA6E4}">
-                  <adec:decorative xmlns:adec="http://schemas.microsoft.com/office/drawing/2017/decorative" xmlns="" val="1"/>
+                  <adec:decorative xmlns:adec="http://schemas.microsoft.com/office/drawing/2017/decorative" val="1"/>
                 </a:ext>
               </a:extLst>
             </p:cNvPr>
@@ -18901,7 +18899,7 @@
                   <a16:creationId xmlns:a16="http://schemas.microsoft.com/office/drawing/2014/main" id="{2619F114-DF39-F544-B487-5430D00E1395}"/>
                 </a:ext>
                 <a:ext uri="{C183D7F6-B498-43B3-948B-1728B52AA6E4}">
-                  <adec:decorative xmlns:adec="http://schemas.microsoft.com/office/drawing/2017/decorative" xmlns="" val="1"/>
+                  <adec:decorative xmlns:adec="http://schemas.microsoft.com/office/drawing/2017/decorative" val="1"/>
                 </a:ext>
               </a:extLst>
             </p:cNvPr>
@@ -19019,7 +19017,7 @@
                   <a16:creationId xmlns:a16="http://schemas.microsoft.com/office/drawing/2014/main" id="{5CDF6368-32C4-A64F-8D2E-11DE400CD92F}"/>
                 </a:ext>
                 <a:ext uri="{C183D7F6-B498-43B3-948B-1728B52AA6E4}">
-                  <adec:decorative xmlns:adec="http://schemas.microsoft.com/office/drawing/2017/decorative" xmlns="" val="1"/>
+                  <adec:decorative xmlns:adec="http://schemas.microsoft.com/office/drawing/2017/decorative" val="1"/>
                 </a:ext>
               </a:extLst>
             </p:cNvPr>
@@ -19137,7 +19135,7 @@
                   <a16:creationId xmlns:a16="http://schemas.microsoft.com/office/drawing/2014/main" id="{148F19D8-49E5-0945-BC17-56044D43D382}"/>
                 </a:ext>
                 <a:ext uri="{C183D7F6-B498-43B3-948B-1728B52AA6E4}">
-                  <adec:decorative xmlns:adec="http://schemas.microsoft.com/office/drawing/2017/decorative" xmlns="" val="1"/>
+                  <adec:decorative xmlns:adec="http://schemas.microsoft.com/office/drawing/2017/decorative" val="1"/>
                 </a:ext>
               </a:extLst>
             </p:cNvPr>
@@ -19254,7 +19252,7 @@
                 <a16:creationId xmlns:a16="http://schemas.microsoft.com/office/drawing/2014/main" id="{68C50EA3-7CF1-9542-A21D-5B3EBACC5009}"/>
               </a:ext>
               <a:ext uri="{C183D7F6-B498-43B3-948B-1728B52AA6E4}">
-                <adec:decorative xmlns:adec="http://schemas.microsoft.com/office/drawing/2017/decorative" xmlns="" val="1"/>
+                <adec:decorative xmlns:adec="http://schemas.microsoft.com/office/drawing/2017/decorative" val="1"/>
               </a:ext>
             </a:extLst>
           </p:cNvPr>
@@ -19346,7 +19344,7 @@
                 <a16:creationId xmlns:a16="http://schemas.microsoft.com/office/drawing/2014/main" id="{C7F2E4D6-EF46-1C43-8F3E-3620C3C83F36}"/>
               </a:ext>
               <a:ext uri="{C183D7F6-B498-43B3-948B-1728B52AA6E4}">
-                <adec:decorative xmlns:adec="http://schemas.microsoft.com/office/drawing/2017/decorative" xmlns="" val="1"/>
+                <adec:decorative xmlns:adec="http://schemas.microsoft.com/office/drawing/2017/decorative" val="1"/>
               </a:ext>
             </a:extLst>
           </p:cNvPr>
@@ -19417,7 +19415,7 @@
         <p:spPr>
           <a:xfrm>
             <a:off x="565150" y="162688"/>
-            <a:ext cx="2163125" cy="725296"/>
+            <a:ext cx="2267987" cy="725296"/>
           </a:xfrm>
         </p:spPr>
         <p:txBody>
@@ -19732,7 +19730,7 @@
                 <a16:creationId xmlns:a16="http://schemas.microsoft.com/office/drawing/2014/main" id="{05ADD15B-C747-D340-BF8A-A1DD2A6A9324}"/>
               </a:ext>
               <a:ext uri="{C183D7F6-B498-43B3-948B-1728B52AA6E4}">
-                <adec:decorative xmlns:adec="http://schemas.microsoft.com/office/drawing/2017/decorative" xmlns="" val="1"/>
+                <adec:decorative xmlns:adec="http://schemas.microsoft.com/office/drawing/2017/decorative" val="1"/>
               </a:ext>
             </a:extLst>
           </p:cNvPr>
@@ -19763,7 +19761,7 @@
                   <a16:creationId xmlns:a16="http://schemas.microsoft.com/office/drawing/2014/main" id="{0B0B662E-0152-FD4E-B468-3F3593C151F4}"/>
                 </a:ext>
                 <a:ext uri="{C183D7F6-B498-43B3-948B-1728B52AA6E4}">
-                  <adec:decorative xmlns:adec="http://schemas.microsoft.com/office/drawing/2017/decorative" xmlns="" val="1"/>
+                  <adec:decorative xmlns:adec="http://schemas.microsoft.com/office/drawing/2017/decorative" val="1"/>
                 </a:ext>
               </a:extLst>
             </p:cNvPr>
@@ -19881,7 +19879,7 @@
                   <a16:creationId xmlns:a16="http://schemas.microsoft.com/office/drawing/2014/main" id="{81BFFC99-6B9D-F240-BD39-160F4C5735BB}"/>
                 </a:ext>
                 <a:ext uri="{C183D7F6-B498-43B3-948B-1728B52AA6E4}">
-                  <adec:decorative xmlns:adec="http://schemas.microsoft.com/office/drawing/2017/decorative" xmlns="" val="1"/>
+                  <adec:decorative xmlns:adec="http://schemas.microsoft.com/office/drawing/2017/decorative" val="1"/>
                 </a:ext>
               </a:extLst>
             </p:cNvPr>
@@ -19999,7 +19997,7 @@
                   <a16:creationId xmlns:a16="http://schemas.microsoft.com/office/drawing/2014/main" id="{4DC6AEB9-EEFF-D243-AEE2-42D0F9E53B54}"/>
                 </a:ext>
                 <a:ext uri="{C183D7F6-B498-43B3-948B-1728B52AA6E4}">
-                  <adec:decorative xmlns:adec="http://schemas.microsoft.com/office/drawing/2017/decorative" xmlns="" val="1"/>
+                  <adec:decorative xmlns:adec="http://schemas.microsoft.com/office/drawing/2017/decorative" val="1"/>
                 </a:ext>
               </a:extLst>
             </p:cNvPr>
@@ -20117,7 +20115,7 @@
                   <a16:creationId xmlns:a16="http://schemas.microsoft.com/office/drawing/2014/main" id="{D89DA958-651D-0049-A549-A9D22E4941F4}"/>
                 </a:ext>
                 <a:ext uri="{C183D7F6-B498-43B3-948B-1728B52AA6E4}">
-                  <adec:decorative xmlns:adec="http://schemas.microsoft.com/office/drawing/2017/decorative" xmlns="" val="1"/>
+                  <adec:decorative xmlns:adec="http://schemas.microsoft.com/office/drawing/2017/decorative" val="1"/>
                 </a:ext>
               </a:extLst>
             </p:cNvPr>
@@ -20234,7 +20232,7 @@
                 <a16:creationId xmlns:a16="http://schemas.microsoft.com/office/drawing/2014/main" id="{1FE039F1-6D47-C642-B506-452A83B0AB11}"/>
               </a:ext>
               <a:ext uri="{C183D7F6-B498-43B3-948B-1728B52AA6E4}">
-                <adec:decorative xmlns:adec="http://schemas.microsoft.com/office/drawing/2017/decorative" xmlns="" val="1"/>
+                <adec:decorative xmlns:adec="http://schemas.microsoft.com/office/drawing/2017/decorative" val="1"/>
               </a:ext>
             </a:extLst>
           </p:cNvPr>
@@ -20390,13 +20388,7 @@
               <a:rPr lang="ru-RU">
                 <a:latin typeface="Montserrat"/>
               </a:rPr>
-              <a:t>для </a:t>
-            </a:r>
-            <a:r>
-              <a:rPr lang="ru-RU" smtClean="0">
-                <a:latin typeface="Montserrat"/>
-              </a:rPr>
-              <a:t>Алгебры и </a:t>
+              <a:t>для Алгебры и </a:t>
             </a:r>
             <a:r>
               <a:rPr lang="ru-RU" dirty="0">
@@ -20425,7 +20417,7 @@
           <a:blip r:embed="rId2">
             <a:extLst>
               <a:ext uri="{96DAC541-7B7A-43D3-8B79-37D633B846F1}">
-                <asvg:svgBlip xmlns:asvg="http://schemas.microsoft.com/office/drawing/2016/SVG/main" xmlns="" r:embed="rId3"/>
+                <asvg:svgBlip xmlns:asvg="http://schemas.microsoft.com/office/drawing/2016/SVG/main" r:embed="rId3"/>
               </a:ext>
             </a:extLst>
           </a:blip>
@@ -20437,6 +20429,36 @@
           <a:xfrm>
             <a:off x="1296323" y="5272183"/>
             <a:ext cx="5394469" cy="814275"/>
+          </a:xfrm>
+          <a:prstGeom prst="rect">
+            <a:avLst/>
+          </a:prstGeom>
+        </p:spPr>
+      </p:pic>
+      <p:pic>
+        <p:nvPicPr>
+          <p:cNvPr id="6" name="Рисунок 5" descr="Изображение выглядит как снимок экрана, дизайн&#10;&#10;Содержимое, созданное искусственным интеллектом, может быть неверным.">
+            <a:extLst>
+              <a:ext uri="{FF2B5EF4-FFF2-40B4-BE49-F238E27FC236}">
+                <a16:creationId xmlns:a16="http://schemas.microsoft.com/office/drawing/2014/main" id="{AC20E520-7763-239A-1446-59DCB3237614}"/>
+              </a:ext>
+            </a:extLst>
+          </p:cNvPr>
+          <p:cNvPicPr>
+            <a:picLocks noChangeAspect="1"/>
+          </p:cNvPicPr>
+          <p:nvPr/>
+        </p:nvPicPr>
+        <p:blipFill>
+          <a:blip r:embed="rId4"/>
+          <a:stretch>
+            <a:fillRect/>
+          </a:stretch>
+        </p:blipFill>
+        <p:spPr>
+          <a:xfrm>
+            <a:off x="7592037" y="4816416"/>
+            <a:ext cx="1216404" cy="1272855"/>
           </a:xfrm>
           <a:prstGeom prst="rect">
             <a:avLst/>

</xml_diff>